<commit_message>
Upload Unity Script Week2 PPT&PDF
</commit_message>
<xml_diff>
--- a/1. 유니티 시작하기.pptx
+++ b/1. 유니티 시작하기.pptx
@@ -50,26 +50,26 @@
   <p:notesSz cx="6858000" cy="9144000"/>
   <p:embeddedFontLst>
     <p:embeddedFont>
-      <p:font typeface="나눔스퀘어" panose="020B0600000101010101" pitchFamily="50" charset="-127"/>
-      <p:regular r:id="rId40"/>
+      <p:font typeface="Source Code Pro Black" panose="020B0809030403020204" pitchFamily="49" charset="0"/>
+      <p:bold r:id="rId40"/>
+      <p:boldItalic r:id="rId41"/>
     </p:embeddedFont>
     <p:embeddedFont>
-      <p:font typeface="나눔스퀘어 ExtraBold" panose="020B0600000101010101" pitchFamily="50" charset="-127"/>
-      <p:bold r:id="rId41"/>
-    </p:embeddedFont>
-    <p:embeddedFont>
-      <p:font typeface="Source Code Pro Black" panose="020B0809030403020204" pitchFamily="49" charset="0"/>
+      <p:font typeface="Source Code Pro Semibold" panose="020B0609030403020204" pitchFamily="49" charset="0"/>
       <p:bold r:id="rId42"/>
       <p:boldItalic r:id="rId43"/>
     </p:embeddedFont>
     <p:embeddedFont>
-      <p:font typeface="Source Code Pro Semibold" panose="020B0609030403020204" pitchFamily="49" charset="0"/>
-      <p:bold r:id="rId44"/>
-      <p:boldItalic r:id="rId45"/>
+      <p:font typeface="Wingdings 2" panose="05020102010507070707" pitchFamily="18" charset="2"/>
+      <p:regular r:id="rId44"/>
     </p:embeddedFont>
     <p:embeddedFont>
-      <p:font typeface="Wingdings 2" panose="05020102010507070707" pitchFamily="18" charset="2"/>
-      <p:regular r:id="rId46"/>
+      <p:font typeface="나눔스퀘어" panose="020B0600000101010101" pitchFamily="50" charset="-127"/>
+      <p:regular r:id="rId45"/>
+    </p:embeddedFont>
+    <p:embeddedFont>
+      <p:font typeface="나눔스퀘어 ExtraBold" panose="020B0600000101010101" pitchFamily="50" charset="-127"/>
+      <p:bold r:id="rId46"/>
     </p:embeddedFont>
   </p:embeddedFontLst>
   <p:defaultTextStyle>
@@ -363,7 +363,7 @@
             <a:fld id="{1850F46A-1323-4936-B6D9-D886638F6835}" type="datetimeFigureOut">
               <a:rPr lang="ko-KR" altLang="en-US" smtClean="0"/>
               <a:pPr/>
-              <a:t>2020/4/7/Tuesday</a:t>
+              <a:t>2020/4/14/Tuesday</a:t>
             </a:fld>
             <a:endParaRPr lang="ko-KR" altLang="en-US" dirty="0"/>
           </a:p>
@@ -2165,7 +2165,7 @@
           <a:p>
             <a:fld id="{FB30EDBD-1C2D-4C1E-B459-B60219FAB484}" type="datetimeFigureOut">
               <a:rPr lang="ko-KR" altLang="en-US" smtClean="0"/>
-              <a:t>2020/4/7/Tuesday</a:t>
+              <a:t>2020/4/14/Tuesday</a:t>
             </a:fld>
             <a:endParaRPr lang="ko-KR" altLang="en-US"/>
           </a:p>
@@ -2335,7 +2335,7 @@
           <a:p>
             <a:fld id="{FB30EDBD-1C2D-4C1E-B459-B60219FAB484}" type="datetimeFigureOut">
               <a:rPr lang="ko-KR" altLang="en-US" smtClean="0"/>
-              <a:t>2020/4/7/Tuesday</a:t>
+              <a:t>2020/4/14/Tuesday</a:t>
             </a:fld>
             <a:endParaRPr lang="ko-KR" altLang="en-US"/>
           </a:p>
@@ -2515,7 +2515,7 @@
           <a:p>
             <a:fld id="{FB30EDBD-1C2D-4C1E-B459-B60219FAB484}" type="datetimeFigureOut">
               <a:rPr lang="ko-KR" altLang="en-US" smtClean="0"/>
-              <a:t>2020/4/7/Tuesday</a:t>
+              <a:t>2020/4/14/Tuesday</a:t>
             </a:fld>
             <a:endParaRPr lang="ko-KR" altLang="en-US"/>
           </a:p>
@@ -2685,7 +2685,7 @@
           <a:p>
             <a:fld id="{FB30EDBD-1C2D-4C1E-B459-B60219FAB484}" type="datetimeFigureOut">
               <a:rPr lang="ko-KR" altLang="en-US" smtClean="0"/>
-              <a:t>2020/4/7/Tuesday</a:t>
+              <a:t>2020/4/14/Tuesday</a:t>
             </a:fld>
             <a:endParaRPr lang="ko-KR" altLang="en-US"/>
           </a:p>
@@ -2938,7 +2938,7 @@
           <a:p>
             <a:fld id="{FB30EDBD-1C2D-4C1E-B459-B60219FAB484}" type="datetimeFigureOut">
               <a:rPr lang="ko-KR" altLang="en-US" smtClean="0"/>
-              <a:t>2020/4/7/Tuesday</a:t>
+              <a:t>2020/4/14/Tuesday</a:t>
             </a:fld>
             <a:endParaRPr lang="ko-KR" altLang="en-US"/>
           </a:p>
@@ -3264,7 +3264,7 @@
           <a:p>
             <a:fld id="{FB30EDBD-1C2D-4C1E-B459-B60219FAB484}" type="datetimeFigureOut">
               <a:rPr lang="ko-KR" altLang="en-US" smtClean="0"/>
-              <a:t>2020/4/7/Tuesday</a:t>
+              <a:t>2020/4/14/Tuesday</a:t>
             </a:fld>
             <a:endParaRPr lang="ko-KR" altLang="en-US"/>
           </a:p>
@@ -3674,7 +3674,7 @@
             <a:fld id="{FB30EDBD-1C2D-4C1E-B459-B60219FAB484}" type="datetimeFigureOut">
               <a:rPr lang="ko-KR" altLang="en-US" smtClean="0"/>
               <a:pPr/>
-              <a:t>2020/4/7/Tuesday</a:t>
+              <a:t>2020/4/14/Tuesday</a:t>
             </a:fld>
             <a:endParaRPr lang="ko-KR" altLang="en-US" dirty="0"/>
           </a:p>
@@ -3793,7 +3793,7 @@
           <a:p>
             <a:fld id="{FB30EDBD-1C2D-4C1E-B459-B60219FAB484}" type="datetimeFigureOut">
               <a:rPr lang="ko-KR" altLang="en-US" smtClean="0"/>
-              <a:t>2020/4/7/Tuesday</a:t>
+              <a:t>2020/4/14/Tuesday</a:t>
             </a:fld>
             <a:endParaRPr lang="ko-KR" altLang="en-US"/>
           </a:p>
@@ -3888,7 +3888,7 @@
           <a:p>
             <a:fld id="{FB30EDBD-1C2D-4C1E-B459-B60219FAB484}" type="datetimeFigureOut">
               <a:rPr lang="ko-KR" altLang="en-US" smtClean="0"/>
-              <a:t>2020/4/7/Tuesday</a:t>
+              <a:t>2020/4/14/Tuesday</a:t>
             </a:fld>
             <a:endParaRPr lang="ko-KR" altLang="en-US"/>
           </a:p>
@@ -4175,7 +4175,7 @@
           <a:p>
             <a:fld id="{FB30EDBD-1C2D-4C1E-B459-B60219FAB484}" type="datetimeFigureOut">
               <a:rPr lang="ko-KR" altLang="en-US" smtClean="0"/>
-              <a:t>2020/4/7/Tuesday</a:t>
+              <a:t>2020/4/14/Tuesday</a:t>
             </a:fld>
             <a:endParaRPr lang="ko-KR" altLang="en-US"/>
           </a:p>
@@ -4490,7 +4490,7 @@
           <a:p>
             <a:fld id="{FB30EDBD-1C2D-4C1E-B459-B60219FAB484}" type="datetimeFigureOut">
               <a:rPr lang="ko-KR" altLang="en-US" smtClean="0"/>
-              <a:t>2020/4/7/Tuesday</a:t>
+              <a:t>2020/4/14/Tuesday</a:t>
             </a:fld>
             <a:endParaRPr lang="ko-KR" altLang="en-US"/>
           </a:p>
@@ -4740,7 +4740,7 @@
             <a:fld id="{FB30EDBD-1C2D-4C1E-B459-B60219FAB484}" type="datetimeFigureOut">
               <a:rPr lang="ko-KR" altLang="en-US" smtClean="0"/>
               <a:pPr/>
-              <a:t>2020/4/7/Tuesday</a:t>
+              <a:t>2020/4/14/Tuesday</a:t>
             </a:fld>
             <a:endParaRPr lang="ko-KR" altLang="en-US" dirty="0"/>
           </a:p>
@@ -6642,18 +6642,18 @@
           <a:p>
             <a:pPr algn="ctr"/>
             <a:r>
-              <a:rPr lang="ko-KR" altLang="en-US"/>
+              <a:rPr lang="ko-KR" altLang="en-US" dirty="0"/>
               <a:t>게임을 만드는 것 </a:t>
             </a:r>
             <a:r>
-              <a:rPr lang="en-US" altLang="ko-KR"/>
+              <a:rPr lang="en-US" altLang="ko-KR" dirty="0"/>
               <a:t>≒ </a:t>
             </a:r>
             <a:r>
-              <a:rPr lang="ko-KR" altLang="en-US"/>
+              <a:rPr lang="ko-KR" altLang="en-US" dirty="0"/>
               <a:t>영화를 제작하는 것</a:t>
             </a:r>
-            <a:endParaRPr lang="en-US" altLang="ko-KR"/>
+            <a:endParaRPr lang="en-US" altLang="ko-KR" dirty="0"/>
           </a:p>
         </p:txBody>
       </p:sp>
@@ -9804,7 +9804,6 @@
               <a:rPr lang="ko-KR" altLang="en-US" dirty="0"/>
               <a:t>게임오브젝트</a:t>
             </a:r>
-            <a:endParaRPr lang="ko-KR" altLang="en-US"/>
           </a:p>
         </p:txBody>
       </p:sp>
@@ -9849,7 +9848,6 @@
               <a:rPr lang="ko-KR" altLang="en-US" dirty="0"/>
               <a:t>먼지</a:t>
             </a:r>
-            <a:endParaRPr lang="ko-KR" altLang="en-US"/>
           </a:p>
         </p:txBody>
       </p:sp>

</xml_diff>